<commit_message>
Update pptx about Hash-of-Hashes
</commit_message>
<xml_diff>
--- a/SAS-techniques/Hash_Hash-of-Hashes.pptx
+++ b/SAS-techniques/Hash_Hash-of-Hashes.pptx
@@ -3793,7 +3793,7 @@
         </p:nvSpPr>
         <p:spPr>
           <a:xfrm>
-            <a:off x="5823995" y="1539760"/>
+            <a:off x="6364227" y="2284400"/>
             <a:ext cx="2141551" cy="707886"/>
           </a:xfrm>
           <a:prstGeom prst="rect">
@@ -4087,7 +4087,7 @@
         </p:nvSpPr>
         <p:spPr>
           <a:xfrm>
-            <a:off x="6894770" y="4825027"/>
+            <a:off x="7435002" y="5569667"/>
             <a:ext cx="1928604" cy="461665"/>
           </a:xfrm>
           <a:prstGeom prst="rect">
@@ -4272,7 +4272,7 @@
         </p:nvSpPr>
         <p:spPr>
           <a:xfrm>
-            <a:off x="8190890" y="1546092"/>
+            <a:off x="8731122" y="2290732"/>
             <a:ext cx="2844000" cy="830997"/>
           </a:xfrm>
           <a:prstGeom prst="rect">
@@ -4578,13 +4578,13 @@
           <p:nvPr>
             <p:extLst>
               <p:ext uri="{D42A27DB-BD31-4B8C-83A1-F6EECF244321}">
-                <p14:modId xmlns:p14="http://schemas.microsoft.com/office/powerpoint/2010/main" val="3835363668"/>
+                <p14:modId xmlns:p14="http://schemas.microsoft.com/office/powerpoint/2010/main" val="3984151788"/>
               </p:ext>
             </p:extLst>
           </p:nvPr>
         </p:nvGraphicFramePr>
         <p:xfrm>
-          <a:off x="355977" y="2676470"/>
+          <a:off x="355977" y="3099552"/>
           <a:ext cx="1294191" cy="1397683"/>
         </p:xfrm>
         <a:graphic>
@@ -4980,13 +4980,13 @@
           <p:nvPr>
             <p:extLst>
               <p:ext uri="{D42A27DB-BD31-4B8C-83A1-F6EECF244321}">
-                <p14:modId xmlns:p14="http://schemas.microsoft.com/office/powerpoint/2010/main" val="375061179"/>
+                <p14:modId xmlns:p14="http://schemas.microsoft.com/office/powerpoint/2010/main" val="616247272"/>
               </p:ext>
             </p:extLst>
           </p:nvPr>
         </p:nvGraphicFramePr>
         <p:xfrm>
-          <a:off x="6434679" y="2191073"/>
+          <a:off x="6974911" y="2935713"/>
           <a:ext cx="1317211" cy="1397683"/>
         </p:xfrm>
         <a:graphic>
@@ -5377,7 +5377,7 @@
         </p:nvSpPr>
         <p:spPr>
           <a:xfrm>
-            <a:off x="355977" y="2449878"/>
+            <a:off x="355977" y="2872960"/>
             <a:ext cx="333993" cy="226591"/>
           </a:xfrm>
           <a:prstGeom prst="rect">
@@ -5418,7 +5418,7 @@
         </p:nvSpPr>
         <p:spPr>
           <a:xfrm>
-            <a:off x="6426657" y="1993579"/>
+            <a:off x="6966889" y="2738219"/>
             <a:ext cx="741156" cy="226591"/>
           </a:xfrm>
           <a:prstGeom prst="rect">
@@ -5467,13 +5467,13 @@
           <p:nvPr>
             <p:extLst>
               <p:ext uri="{D42A27DB-BD31-4B8C-83A1-F6EECF244321}">
-                <p14:modId xmlns:p14="http://schemas.microsoft.com/office/powerpoint/2010/main" val="2793040888"/>
+                <p14:modId xmlns:p14="http://schemas.microsoft.com/office/powerpoint/2010/main" val="974698140"/>
               </p:ext>
             </p:extLst>
           </p:nvPr>
         </p:nvGraphicFramePr>
         <p:xfrm>
-          <a:off x="6204249" y="3890041"/>
+          <a:off x="6744481" y="4634681"/>
           <a:ext cx="2453914" cy="897600"/>
         </p:xfrm>
         <a:graphic>
@@ -5889,7 +5889,7 @@
         </p:nvSpPr>
         <p:spPr>
           <a:xfrm>
-            <a:off x="6197250" y="3692547"/>
+            <a:off x="6737482" y="4437187"/>
             <a:ext cx="652990" cy="226591"/>
           </a:xfrm>
           <a:prstGeom prst="rect">
@@ -5938,13 +5938,13 @@
           <p:nvPr>
             <p:extLst>
               <p:ext uri="{D42A27DB-BD31-4B8C-83A1-F6EECF244321}">
-                <p14:modId xmlns:p14="http://schemas.microsoft.com/office/powerpoint/2010/main" val="408908225"/>
+                <p14:modId xmlns:p14="http://schemas.microsoft.com/office/powerpoint/2010/main" val="1823568047"/>
               </p:ext>
             </p:extLst>
           </p:nvPr>
         </p:nvGraphicFramePr>
         <p:xfrm>
-          <a:off x="8685174" y="2324767"/>
+          <a:off x="9225406" y="3069407"/>
           <a:ext cx="1379806" cy="428083"/>
         </p:xfrm>
         <a:graphic>
@@ -6091,13 +6091,13 @@
           <p:nvPr>
             <p:extLst>
               <p:ext uri="{D42A27DB-BD31-4B8C-83A1-F6EECF244321}">
-                <p14:modId xmlns:p14="http://schemas.microsoft.com/office/powerpoint/2010/main" val="2137630779"/>
+                <p14:modId xmlns:p14="http://schemas.microsoft.com/office/powerpoint/2010/main" val="872429484"/>
               </p:ext>
             </p:extLst>
           </p:nvPr>
         </p:nvGraphicFramePr>
         <p:xfrm>
-          <a:off x="9095436" y="2919794"/>
+          <a:off x="9635668" y="3664434"/>
           <a:ext cx="1363314" cy="815923"/>
         </p:xfrm>
         <a:graphic>
@@ -6342,13 +6342,13 @@
           <p:nvPr>
             <p:extLst>
               <p:ext uri="{D42A27DB-BD31-4B8C-83A1-F6EECF244321}">
-                <p14:modId xmlns:p14="http://schemas.microsoft.com/office/powerpoint/2010/main" val="942053473"/>
+                <p14:modId xmlns:p14="http://schemas.microsoft.com/office/powerpoint/2010/main" val="210637185"/>
               </p:ext>
             </p:extLst>
           </p:nvPr>
         </p:nvGraphicFramePr>
         <p:xfrm>
-          <a:off x="9541228" y="3891510"/>
+          <a:off x="10081460" y="4636150"/>
           <a:ext cx="1348205" cy="622003"/>
         </p:xfrm>
         <a:graphic>
@@ -6543,7 +6543,7 @@
         </p:nvSpPr>
         <p:spPr>
           <a:xfrm>
-            <a:off x="8685174" y="2098176"/>
+            <a:off x="9225406" y="2842816"/>
             <a:ext cx="1220453" cy="226591"/>
           </a:xfrm>
           <a:prstGeom prst="rect">
@@ -6591,7 +6591,7 @@
         </p:nvSpPr>
         <p:spPr>
           <a:xfrm>
-            <a:off x="9095436" y="2693203"/>
+            <a:off x="9635668" y="3437843"/>
             <a:ext cx="1215645" cy="226591"/>
           </a:xfrm>
           <a:prstGeom prst="rect">
@@ -6639,7 +6639,7 @@
         </p:nvSpPr>
         <p:spPr>
           <a:xfrm>
-            <a:off x="9500056" y="3673474"/>
+            <a:off x="10040288" y="4418114"/>
             <a:ext cx="1210835" cy="226591"/>
           </a:xfrm>
           <a:prstGeom prst="rect">
@@ -6688,13 +6688,13 @@
           <p:nvPr>
             <p:extLst>
               <p:ext uri="{D42A27DB-BD31-4B8C-83A1-F6EECF244321}">
-                <p14:modId xmlns:p14="http://schemas.microsoft.com/office/powerpoint/2010/main" val="2418059931"/>
+                <p14:modId xmlns:p14="http://schemas.microsoft.com/office/powerpoint/2010/main" val="134080405"/>
               </p:ext>
             </p:extLst>
           </p:nvPr>
         </p:nvGraphicFramePr>
         <p:xfrm>
-          <a:off x="2339893" y="3048657"/>
+          <a:off x="2626501" y="3539979"/>
           <a:ext cx="1327486" cy="815923"/>
         </p:xfrm>
         <a:graphic>
@@ -6929,7 +6929,7 @@
         </p:nvSpPr>
         <p:spPr>
           <a:xfrm>
-            <a:off x="2318535" y="2622496"/>
+            <a:off x="2605143" y="3113818"/>
             <a:ext cx="733140" cy="226591"/>
           </a:xfrm>
           <a:prstGeom prst="rect">
@@ -6971,13 +6971,13 @@
           <p:nvPr>
             <p:extLst>
               <p:ext uri="{D42A27DB-BD31-4B8C-83A1-F6EECF244321}">
-                <p14:modId xmlns:p14="http://schemas.microsoft.com/office/powerpoint/2010/main" val="1871902152"/>
+                <p14:modId xmlns:p14="http://schemas.microsoft.com/office/powerpoint/2010/main" val="3176111985"/>
               </p:ext>
             </p:extLst>
           </p:nvPr>
         </p:nvGraphicFramePr>
         <p:xfrm>
-          <a:off x="4098939" y="2706670"/>
+          <a:off x="4385547" y="3197992"/>
           <a:ext cx="982201" cy="428083"/>
         </p:xfrm>
         <a:graphic>
@@ -7089,7 +7089,7 @@
         </p:nvCxnSpPr>
         <p:spPr>
           <a:xfrm flipV="1">
-            <a:off x="2682303" y="3084147"/>
+            <a:off x="2968911" y="3575469"/>
             <a:ext cx="0" cy="144000"/>
           </a:xfrm>
           <a:prstGeom prst="straightConnector1">
@@ -7131,7 +7131,7 @@
         </p:nvSpPr>
         <p:spPr>
           <a:xfrm>
-            <a:off x="4033027" y="2308711"/>
+            <a:off x="4319635" y="2800033"/>
             <a:ext cx="1178775" cy="226591"/>
           </a:xfrm>
           <a:prstGeom prst="rect">
@@ -7174,7 +7174,7 @@
         </p:nvCxnSpPr>
         <p:spPr>
           <a:xfrm>
-            <a:off x="4430566" y="2749177"/>
+            <a:off x="4717174" y="3240499"/>
             <a:ext cx="0" cy="144000"/>
           </a:xfrm>
           <a:prstGeom prst="straightConnector1">
@@ -7217,13 +7217,13 @@
           <p:nvPr>
             <p:extLst>
               <p:ext uri="{D42A27DB-BD31-4B8C-83A1-F6EECF244321}">
-                <p14:modId xmlns:p14="http://schemas.microsoft.com/office/powerpoint/2010/main" val="2854943641"/>
+                <p14:modId xmlns:p14="http://schemas.microsoft.com/office/powerpoint/2010/main" val="2976564353"/>
               </p:ext>
             </p:extLst>
           </p:nvPr>
         </p:nvGraphicFramePr>
         <p:xfrm>
-          <a:off x="4441314" y="3102563"/>
+          <a:off x="4727922" y="3593885"/>
           <a:ext cx="982201" cy="815923"/>
         </p:xfrm>
         <a:graphic>
@@ -7406,13 +7406,13 @@
           <p:nvPr>
             <p:extLst>
               <p:ext uri="{D42A27DB-BD31-4B8C-83A1-F6EECF244321}">
-                <p14:modId xmlns:p14="http://schemas.microsoft.com/office/powerpoint/2010/main" val="3758871728"/>
+                <p14:modId xmlns:p14="http://schemas.microsoft.com/office/powerpoint/2010/main" val="3933989932"/>
               </p:ext>
             </p:extLst>
           </p:nvPr>
         </p:nvGraphicFramePr>
         <p:xfrm>
-          <a:off x="3998347" y="3891510"/>
+          <a:off x="4284955" y="4382832"/>
           <a:ext cx="982201" cy="622003"/>
         </p:xfrm>
         <a:graphic>
@@ -7563,7 +7563,7 @@
         </p:nvCxnSpPr>
         <p:spPr>
           <a:xfrm flipV="1">
-            <a:off x="3589679" y="2920711"/>
+            <a:off x="3876287" y="3412033"/>
             <a:ext cx="509260" cy="427091"/>
           </a:xfrm>
           <a:prstGeom prst="straightConnector1">
@@ -7610,7 +7610,7 @@
         </p:nvCxnSpPr>
         <p:spPr>
           <a:xfrm flipV="1">
-            <a:off x="3605495" y="3262699"/>
+            <a:off x="3892103" y="3754021"/>
             <a:ext cx="835819" cy="300316"/>
           </a:xfrm>
           <a:prstGeom prst="straightConnector1">
@@ -7657,7 +7657,7 @@
         </p:nvCxnSpPr>
         <p:spPr>
           <a:xfrm>
-            <a:off x="3605495" y="3777315"/>
+            <a:off x="3892103" y="4268637"/>
             <a:ext cx="389376" cy="193565"/>
           </a:xfrm>
           <a:prstGeom prst="straightConnector1">
@@ -7701,7 +7701,7 @@
         </p:nvSpPr>
         <p:spPr>
           <a:xfrm>
-            <a:off x="3497495" y="3331986"/>
+            <a:off x="3784103" y="3823308"/>
             <a:ext cx="108000" cy="108000"/>
           </a:xfrm>
           <a:prstGeom prst="ellipse">
@@ -7755,7 +7755,7 @@
         </p:nvSpPr>
         <p:spPr>
           <a:xfrm>
-            <a:off x="3497495" y="3509015"/>
+            <a:off x="3784103" y="4000337"/>
             <a:ext cx="108000" cy="108000"/>
           </a:xfrm>
           <a:prstGeom prst="ellipse">
@@ -7809,7 +7809,7 @@
         </p:nvSpPr>
         <p:spPr>
           <a:xfrm>
-            <a:off x="3497495" y="3723315"/>
+            <a:off x="3784103" y="4214637"/>
             <a:ext cx="108000" cy="108000"/>
           </a:xfrm>
           <a:prstGeom prst="ellipse">
@@ -7865,7 +7865,7 @@
         </p:nvCxnSpPr>
         <p:spPr>
           <a:xfrm flipV="1">
-            <a:off x="6762722" y="2220170"/>
+            <a:off x="7302954" y="2964810"/>
             <a:ext cx="0" cy="144000"/>
           </a:xfrm>
           <a:prstGeom prst="straightConnector1">
@@ -7909,7 +7909,7 @@
         </p:nvCxnSpPr>
         <p:spPr>
           <a:xfrm>
-            <a:off x="7127279" y="2233920"/>
+            <a:off x="7667511" y="2978560"/>
             <a:ext cx="0" cy="144000"/>
           </a:xfrm>
           <a:prstGeom prst="straightConnector1">
@@ -7953,7 +7953,7 @@
         </p:nvCxnSpPr>
         <p:spPr>
           <a:xfrm>
-            <a:off x="9820388" y="2961090"/>
+            <a:off x="10360620" y="3705730"/>
             <a:ext cx="0" cy="144000"/>
           </a:xfrm>
           <a:prstGeom prst="straightConnector1">
@@ -7997,7 +7997,7 @@
         </p:nvCxnSpPr>
         <p:spPr>
           <a:xfrm>
-            <a:off x="9412867" y="2362007"/>
+            <a:off x="9953099" y="3106647"/>
             <a:ext cx="0" cy="144000"/>
           </a:xfrm>
           <a:prstGeom prst="straightConnector1">
@@ -8041,7 +8041,7 @@
         </p:nvCxnSpPr>
         <p:spPr>
           <a:xfrm>
-            <a:off x="10270808" y="3948112"/>
+            <a:off x="10811040" y="4692752"/>
             <a:ext cx="0" cy="144000"/>
           </a:xfrm>
           <a:prstGeom prst="straightConnector1">
@@ -8083,7 +8083,7 @@
         </p:nvCxnSpPr>
         <p:spPr>
           <a:xfrm flipV="1">
-            <a:off x="6525438" y="3938528"/>
+            <a:off x="7065670" y="4683168"/>
             <a:ext cx="0" cy="144000"/>
           </a:xfrm>
           <a:prstGeom prst="straightConnector1">
@@ -8127,7 +8127,7 @@
         </p:nvCxnSpPr>
         <p:spPr>
           <a:xfrm>
-            <a:off x="4746825" y="3134753"/>
+            <a:off x="5033433" y="3626075"/>
             <a:ext cx="0" cy="144000"/>
           </a:xfrm>
           <a:prstGeom prst="straightConnector1">
@@ -8171,7 +8171,7 @@
         </p:nvCxnSpPr>
         <p:spPr>
           <a:xfrm>
-            <a:off x="4320563" y="3932236"/>
+            <a:off x="4607171" y="4423558"/>
             <a:ext cx="0" cy="144000"/>
           </a:xfrm>
           <a:prstGeom prst="straightConnector1">
@@ -8213,7 +8213,7 @@
         </p:nvSpPr>
         <p:spPr>
           <a:xfrm>
-            <a:off x="2013838" y="3947583"/>
+            <a:off x="2300446" y="4438905"/>
             <a:ext cx="1656000" cy="369854"/>
           </a:xfrm>
           <a:prstGeom prst="wedgeRoundRectCallout">
@@ -8285,7 +8285,7 @@
         </p:nvSpPr>
         <p:spPr>
           <a:xfrm>
-            <a:off x="2633495" y="4556378"/>
+            <a:off x="2920103" y="5047700"/>
             <a:ext cx="1692000" cy="369854"/>
           </a:xfrm>
           <a:prstGeom prst="wedgeRoundRectCallout">
@@ -8357,7 +8357,7 @@
         </p:nvSpPr>
         <p:spPr>
           <a:xfrm>
-            <a:off x="2339893" y="2807415"/>
+            <a:off x="2626501" y="3298737"/>
             <a:ext cx="593680" cy="226591"/>
           </a:xfrm>
           <a:prstGeom prst="rect">
@@ -8401,7 +8401,7 @@
         </p:nvSpPr>
         <p:spPr>
           <a:xfrm>
-            <a:off x="4107283" y="2503624"/>
+            <a:off x="4393891" y="2994946"/>
             <a:ext cx="515132" cy="226591"/>
           </a:xfrm>
           <a:prstGeom prst="rect">
@@ -8445,7 +8445,7 @@
         </p:nvSpPr>
         <p:spPr>
           <a:xfrm>
-            <a:off x="8190890" y="932644"/>
+            <a:off x="8731122" y="1677284"/>
             <a:ext cx="2520000" cy="509459"/>
           </a:xfrm>
           <a:prstGeom prst="wedgeRoundRectCallout">
@@ -8587,7 +8587,7 @@
         </p:nvSpPr>
         <p:spPr>
           <a:xfrm>
-            <a:off x="5588085" y="1061816"/>
+            <a:off x="6128317" y="1806456"/>
             <a:ext cx="2377461" cy="369854"/>
           </a:xfrm>
           <a:prstGeom prst="wedgeRoundRectCallout">
@@ -8697,7 +8697,7 @@
         </p:nvSpPr>
         <p:spPr>
           <a:xfrm>
-            <a:off x="5411602" y="4859035"/>
+            <a:off x="5951834" y="5603675"/>
             <a:ext cx="1488053" cy="459955"/>
           </a:xfrm>
           <a:prstGeom prst="wedgeRoundRectCallout">
@@ -8790,7 +8790,7 @@
         </p:nvCxnSpPr>
         <p:spPr>
           <a:xfrm flipV="1">
-            <a:off x="9007724" y="2365019"/>
+            <a:off x="9547956" y="3109659"/>
             <a:ext cx="0" cy="144000"/>
           </a:xfrm>
           <a:prstGeom prst="straightConnector1">
@@ -8834,7 +8834,7 @@
         </p:nvCxnSpPr>
         <p:spPr>
           <a:xfrm flipV="1">
-            <a:off x="9424018" y="2956314"/>
+            <a:off x="9964250" y="3700954"/>
             <a:ext cx="0" cy="144000"/>
           </a:xfrm>
           <a:prstGeom prst="straightConnector1">
@@ -8878,7 +8878,7 @@
         </p:nvCxnSpPr>
         <p:spPr>
           <a:xfrm flipV="1">
-            <a:off x="9872174" y="3920865"/>
+            <a:off x="10412406" y="4665505"/>
             <a:ext cx="0" cy="144000"/>
           </a:xfrm>
           <a:prstGeom prst="straightConnector1">
@@ -8906,6 +8906,712 @@
           </a:fontRef>
         </p:style>
       </p:cxnSp>
+      <p:sp>
+        <p:nvSpPr>
+          <p:cNvPr id="3" name="Rectangle 2">
+            <a:extLst>
+              <a:ext uri="{FF2B5EF4-FFF2-40B4-BE49-F238E27FC236}">
+                <a16:creationId xmlns:a16="http://schemas.microsoft.com/office/drawing/2014/main" id="{6FA6F79E-EF95-3343-8A60-8AF6E17A2024}"/>
+              </a:ext>
+            </a:extLst>
+          </p:cNvPr>
+          <p:cNvSpPr/>
+          <p:nvPr/>
+        </p:nvSpPr>
+        <p:spPr>
+          <a:xfrm>
+            <a:off x="84390" y="279457"/>
+            <a:ext cx="2634032" cy="759030"/>
+          </a:xfrm>
+          <a:prstGeom prst="rect">
+            <a:avLst/>
+          </a:prstGeom>
+          <a:solidFill>
+            <a:schemeClr val="accent1">
+              <a:lumMod val="20000"/>
+              <a:lumOff val="80000"/>
+            </a:schemeClr>
+          </a:solidFill>
+          <a:ln>
+            <a:noFill/>
+          </a:ln>
+          <a:effectLst>
+            <a:outerShdw blurRad="50800" dist="38100" dir="2700000" algn="tl" rotWithShape="0">
+              <a:prstClr val="black">
+                <a:alpha val="40000"/>
+              </a:prstClr>
+            </a:outerShdw>
+          </a:effectLst>
+        </p:spPr>
+        <p:style>
+          <a:lnRef idx="2">
+            <a:schemeClr val="accent1">
+              <a:shade val="50000"/>
+            </a:schemeClr>
+          </a:lnRef>
+          <a:fillRef idx="1">
+            <a:schemeClr val="accent1"/>
+          </a:fillRef>
+          <a:effectRef idx="0">
+            <a:schemeClr val="accent1"/>
+          </a:effectRef>
+          <a:fontRef idx="minor">
+            <a:schemeClr val="lt1"/>
+          </a:fontRef>
+        </p:style>
+        <p:txBody>
+          <a:bodyPr rtlCol="0" anchor="t"/>
+          <a:lstStyle/>
+          <a:p>
+            <a:r>
+              <a:rPr lang="en-US" sz="1000" b="1" dirty="0">
+                <a:solidFill>
+                  <a:schemeClr val="tx1"/>
+                </a:solidFill>
+              </a:rPr>
+              <a:t>Setup</a:t>
+            </a:r>
+          </a:p>
+          <a:p>
+            <a:r>
+              <a:rPr lang="en-US" sz="1000" dirty="0">
+                <a:solidFill>
+                  <a:schemeClr val="tx1"/>
+                </a:solidFill>
+              </a:rPr>
+              <a:t>Input data gets processed in a DATA STEP and needs sorting by some variables in ascending and by others in descending order.</a:t>
+            </a:r>
+          </a:p>
+        </p:txBody>
+      </p:sp>
+      <p:sp>
+        <p:nvSpPr>
+          <p:cNvPr id="58" name="Rectangle 57">
+            <a:extLst>
+              <a:ext uri="{FF2B5EF4-FFF2-40B4-BE49-F238E27FC236}">
+                <a16:creationId xmlns:a16="http://schemas.microsoft.com/office/drawing/2014/main" id="{D7521B6A-0242-9344-8B3C-AD6CCD62ABE3}"/>
+              </a:ext>
+            </a:extLst>
+          </p:cNvPr>
+          <p:cNvSpPr/>
+          <p:nvPr/>
+        </p:nvSpPr>
+        <p:spPr>
+          <a:xfrm>
+            <a:off x="2883871" y="267692"/>
+            <a:ext cx="3024177" cy="1044000"/>
+          </a:xfrm>
+          <a:prstGeom prst="rect">
+            <a:avLst/>
+          </a:prstGeom>
+          <a:solidFill>
+            <a:schemeClr val="bg1">
+              <a:lumMod val="95000"/>
+            </a:schemeClr>
+          </a:solidFill>
+          <a:ln>
+            <a:noFill/>
+          </a:ln>
+          <a:effectLst>
+            <a:outerShdw blurRad="50800" dist="38100" dir="2700000" algn="tl" rotWithShape="0">
+              <a:prstClr val="black">
+                <a:alpha val="40000"/>
+              </a:prstClr>
+            </a:outerShdw>
+          </a:effectLst>
+        </p:spPr>
+        <p:style>
+          <a:lnRef idx="2">
+            <a:schemeClr val="accent1">
+              <a:shade val="50000"/>
+            </a:schemeClr>
+          </a:lnRef>
+          <a:fillRef idx="1">
+            <a:schemeClr val="accent1"/>
+          </a:fillRef>
+          <a:effectRef idx="0">
+            <a:schemeClr val="accent1"/>
+          </a:effectRef>
+          <a:fontRef idx="minor">
+            <a:schemeClr val="lt1"/>
+          </a:fontRef>
+        </p:style>
+        <p:txBody>
+          <a:bodyPr rtlCol="0" anchor="t"/>
+          <a:lstStyle/>
+          <a:p>
+            <a:r>
+              <a:rPr lang="en-US" sz="1000" b="1" dirty="0">
+                <a:solidFill>
+                  <a:schemeClr val="tx1"/>
+                </a:solidFill>
+              </a:rPr>
+              <a:t>Approach</a:t>
+            </a:r>
+          </a:p>
+          <a:p>
+            <a:pPr marL="95250" indent="-95250">
+              <a:buFontTx/>
+              <a:buChar char="-"/>
+            </a:pPr>
+            <a:r>
+              <a:rPr lang="en-US" sz="1000" dirty="0">
+                <a:solidFill>
+                  <a:schemeClr val="tx1"/>
+                </a:solidFill>
+              </a:rPr>
+              <a:t>Use a "main" hash to store the first variable(s) to base the sort on.</a:t>
+            </a:r>
+          </a:p>
+          <a:p>
+            <a:pPr marL="95250" indent="-95250">
+              <a:buFontTx/>
+              <a:buChar char="-"/>
+            </a:pPr>
+            <a:r>
+              <a:rPr lang="en-US" sz="1000" dirty="0">
+                <a:solidFill>
+                  <a:schemeClr val="tx1"/>
+                </a:solidFill>
+              </a:rPr>
+              <a:t>As soon as the sort requires a variable to be sorted in another direction than the one before, create a "sub" hash that the hash from before points to.</a:t>
+            </a:r>
+          </a:p>
+        </p:txBody>
+      </p:sp>
+      <p:sp>
+        <p:nvSpPr>
+          <p:cNvPr id="59" name="Rectangle 58">
+            <a:extLst>
+              <a:ext uri="{FF2B5EF4-FFF2-40B4-BE49-F238E27FC236}">
+                <a16:creationId xmlns:a16="http://schemas.microsoft.com/office/drawing/2014/main" id="{45000615-6EAE-CC4F-BC74-6A986557C5C9}"/>
+              </a:ext>
+            </a:extLst>
+          </p:cNvPr>
+          <p:cNvSpPr/>
+          <p:nvPr/>
+        </p:nvSpPr>
+        <p:spPr>
+          <a:xfrm>
+            <a:off x="6244158" y="274419"/>
+            <a:ext cx="2453914" cy="432076"/>
+          </a:xfrm>
+          <a:prstGeom prst="rect">
+            <a:avLst/>
+          </a:prstGeom>
+          <a:solidFill>
+            <a:schemeClr val="accent6">
+              <a:lumMod val="20000"/>
+              <a:lumOff val="80000"/>
+            </a:schemeClr>
+          </a:solidFill>
+          <a:ln>
+            <a:noFill/>
+          </a:ln>
+          <a:effectLst>
+            <a:outerShdw blurRad="50800" dist="38100" dir="2700000" algn="tl" rotWithShape="0">
+              <a:prstClr val="black">
+                <a:alpha val="40000"/>
+              </a:prstClr>
+            </a:outerShdw>
+          </a:effectLst>
+        </p:spPr>
+        <p:style>
+          <a:lnRef idx="2">
+            <a:schemeClr val="accent1">
+              <a:shade val="50000"/>
+            </a:schemeClr>
+          </a:lnRef>
+          <a:fillRef idx="1">
+            <a:schemeClr val="accent1"/>
+          </a:fillRef>
+          <a:effectRef idx="0">
+            <a:schemeClr val="accent1"/>
+          </a:effectRef>
+          <a:fontRef idx="minor">
+            <a:schemeClr val="lt1"/>
+          </a:fontRef>
+        </p:style>
+        <p:txBody>
+          <a:bodyPr rtlCol="0" anchor="t"/>
+          <a:lstStyle/>
+          <a:p>
+            <a:r>
+              <a:rPr lang="en-US" sz="1000" b="1" dirty="0">
+                <a:solidFill>
+                  <a:schemeClr val="tx1"/>
+                </a:solidFill>
+              </a:rPr>
+              <a:t>Result:</a:t>
+            </a:r>
+          </a:p>
+          <a:p>
+            <a:r>
+              <a:rPr lang="en-US" sz="1000" dirty="0">
+                <a:solidFill>
+                  <a:schemeClr val="tx1"/>
+                </a:solidFill>
+              </a:rPr>
+              <a:t>Output data set in required sorting order.</a:t>
+            </a:r>
+          </a:p>
+        </p:txBody>
+      </p:sp>
+      <p:sp>
+        <p:nvSpPr>
+          <p:cNvPr id="60" name="Rounded Rectangular Callout 59">
+            <a:extLst>
+              <a:ext uri="{FF2B5EF4-FFF2-40B4-BE49-F238E27FC236}">
+                <a16:creationId xmlns:a16="http://schemas.microsoft.com/office/drawing/2014/main" id="{9221F62A-0805-5C48-960A-6A799ECDBAB2}"/>
+              </a:ext>
+            </a:extLst>
+          </p:cNvPr>
+          <p:cNvSpPr/>
+          <p:nvPr/>
+        </p:nvSpPr>
+        <p:spPr>
+          <a:xfrm>
+            <a:off x="84390" y="1857582"/>
+            <a:ext cx="2124000" cy="864000"/>
+          </a:xfrm>
+          <a:prstGeom prst="wedgeRoundRectCallout">
+            <a:avLst>
+              <a:gd name="adj1" fmla="val -13129"/>
+              <a:gd name="adj2" fmla="val 68716"/>
+              <a:gd name="adj3" fmla="val 16667"/>
+            </a:avLst>
+          </a:prstGeom>
+          <a:solidFill>
+            <a:schemeClr val="accent1">
+              <a:lumMod val="20000"/>
+              <a:lumOff val="80000"/>
+            </a:schemeClr>
+          </a:solidFill>
+          <a:ln>
+            <a:noFill/>
+          </a:ln>
+          <a:effectLst>
+            <a:outerShdw blurRad="50800" dist="38100" dir="2700000" algn="tl" rotWithShape="0">
+              <a:prstClr val="black">
+                <a:alpha val="40000"/>
+              </a:prstClr>
+            </a:outerShdw>
+          </a:effectLst>
+        </p:spPr>
+        <p:style>
+          <a:lnRef idx="2">
+            <a:schemeClr val="accent1">
+              <a:shade val="50000"/>
+            </a:schemeClr>
+          </a:lnRef>
+          <a:fillRef idx="1">
+            <a:schemeClr val="accent1"/>
+          </a:fillRef>
+          <a:effectRef idx="0">
+            <a:schemeClr val="accent1"/>
+          </a:effectRef>
+          <a:fontRef idx="minor">
+            <a:schemeClr val="lt1"/>
+          </a:fontRef>
+        </p:style>
+        <p:txBody>
+          <a:bodyPr rot="0" spcFirstLastPara="0" vertOverflow="overflow" horzOverflow="overflow" vert="horz" wrap="square" lIns="91440" tIns="45720" rIns="91440" bIns="45720" numCol="1" spcCol="0" rtlCol="0" fromWordArt="0" anchor="t" anchorCtr="0" forceAA="0" compatLnSpc="1">
+            <a:prstTxWarp prst="textNoShape">
+              <a:avLst/>
+            </a:prstTxWarp>
+            <a:noAutofit/>
+          </a:bodyPr>
+          <a:lstStyle/>
+          <a:p>
+            <a:r>
+              <a:rPr lang="en-US" sz="900" b="1" dirty="0">
+                <a:solidFill>
+                  <a:schemeClr val="tx1"/>
+                </a:solidFill>
+              </a:rPr>
+              <a:t>Example Setup</a:t>
+            </a:r>
+          </a:p>
+          <a:p>
+            <a:r>
+              <a:rPr lang="en-US" sz="900" dirty="0">
+                <a:solidFill>
+                  <a:schemeClr val="tx1"/>
+                </a:solidFill>
+              </a:rPr>
+              <a:t>Sales data as shown below is processed in a DATA STEP and needs sorting by</a:t>
+            </a:r>
+          </a:p>
+          <a:p>
+            <a:pPr marL="180975" indent="-180975">
+              <a:buAutoNum type="arabicParenBoth"/>
+            </a:pPr>
+            <a:r>
+              <a:rPr lang="en-US" sz="900" dirty="0">
+                <a:solidFill>
+                  <a:schemeClr val="tx1"/>
+                </a:solidFill>
+              </a:rPr>
+              <a:t>'store' in ascending direction</a:t>
+            </a:r>
+          </a:p>
+          <a:p>
+            <a:pPr marL="180975" indent="-180975">
+              <a:buAutoNum type="arabicParenBoth"/>
+            </a:pPr>
+            <a:r>
+              <a:rPr lang="en-US" sz="900" dirty="0">
+                <a:solidFill>
+                  <a:schemeClr val="tx1"/>
+                </a:solidFill>
+              </a:rPr>
+              <a:t>'sales' in descending direction</a:t>
+            </a:r>
+          </a:p>
+        </p:txBody>
+      </p:sp>
+      <p:sp>
+        <p:nvSpPr>
+          <p:cNvPr id="61" name="Rounded Rectangular Callout 60">
+            <a:extLst>
+              <a:ext uri="{FF2B5EF4-FFF2-40B4-BE49-F238E27FC236}">
+                <a16:creationId xmlns:a16="http://schemas.microsoft.com/office/drawing/2014/main" id="{09F724C1-0509-4C46-9237-548A478A5111}"/>
+              </a:ext>
+            </a:extLst>
+          </p:cNvPr>
+          <p:cNvSpPr/>
+          <p:nvPr/>
+        </p:nvSpPr>
+        <p:spPr>
+          <a:xfrm>
+            <a:off x="2652854" y="1475901"/>
+            <a:ext cx="3312000" cy="1152269"/>
+          </a:xfrm>
+          <a:prstGeom prst="wedgeRoundRectCallout">
+            <a:avLst>
+              <a:gd name="adj1" fmla="val -11821"/>
+              <a:gd name="adj2" fmla="val 63817"/>
+              <a:gd name="adj3" fmla="val 16667"/>
+            </a:avLst>
+          </a:prstGeom>
+          <a:solidFill>
+            <a:schemeClr val="bg1">
+              <a:lumMod val="95000"/>
+            </a:schemeClr>
+          </a:solidFill>
+          <a:ln>
+            <a:noFill/>
+          </a:ln>
+          <a:effectLst>
+            <a:outerShdw blurRad="50800" dist="38100" dir="2700000" algn="tl" rotWithShape="0">
+              <a:prstClr val="black">
+                <a:alpha val="40000"/>
+              </a:prstClr>
+            </a:outerShdw>
+          </a:effectLst>
+        </p:spPr>
+        <p:style>
+          <a:lnRef idx="2">
+            <a:schemeClr val="accent1">
+              <a:shade val="50000"/>
+            </a:schemeClr>
+          </a:lnRef>
+          <a:fillRef idx="1">
+            <a:schemeClr val="accent1"/>
+          </a:fillRef>
+          <a:effectRef idx="0">
+            <a:schemeClr val="accent1"/>
+          </a:effectRef>
+          <a:fontRef idx="minor">
+            <a:schemeClr val="lt1"/>
+          </a:fontRef>
+        </p:style>
+        <p:txBody>
+          <a:bodyPr rot="0" spcFirstLastPara="0" vertOverflow="overflow" horzOverflow="overflow" vert="horz" wrap="square" lIns="91440" tIns="45720" rIns="91440" bIns="45720" numCol="1" spcCol="0" rtlCol="0" fromWordArt="0" anchor="t" anchorCtr="0" forceAA="0" compatLnSpc="1">
+            <a:prstTxWarp prst="textNoShape">
+              <a:avLst/>
+            </a:prstTxWarp>
+            <a:noAutofit/>
+          </a:bodyPr>
+          <a:lstStyle/>
+          <a:p>
+            <a:r>
+              <a:rPr lang="en-US" sz="900" b="1" dirty="0">
+                <a:solidFill>
+                  <a:schemeClr val="tx1"/>
+                </a:solidFill>
+              </a:rPr>
+              <a:t>Example Approach</a:t>
+            </a:r>
+            <a:endParaRPr lang="en-US" sz="900" dirty="0">
+              <a:solidFill>
+                <a:schemeClr val="tx1"/>
+              </a:solidFill>
+            </a:endParaRPr>
+          </a:p>
+          <a:p>
+            <a:r>
+              <a:rPr lang="en-US" sz="900" dirty="0">
+                <a:solidFill>
+                  <a:schemeClr val="tx1"/>
+                </a:solidFill>
+              </a:rPr>
+              <a:t>The first </a:t>
+            </a:r>
+            <a:r>
+              <a:rPr lang="en-US" sz="900" dirty="0">
+                <a:solidFill>
+                  <a:schemeClr val="tx1"/>
+                </a:solidFill>
+                <a:highlight>
+                  <a:srgbClr val="FFFF00"/>
+                </a:highlight>
+              </a:rPr>
+              <a:t>("main") hash</a:t>
+            </a:r>
+          </a:p>
+          <a:p>
+            <a:pPr marL="95250" indent="-95250">
+              <a:buFontTx/>
+              <a:buChar char="-"/>
+            </a:pPr>
+            <a:r>
+              <a:rPr lang="en-US" sz="900" dirty="0">
+                <a:solidFill>
+                  <a:schemeClr val="tx1"/>
+                </a:solidFill>
+              </a:rPr>
+              <a:t>contains 'store' that is used to sort the data in ascending order</a:t>
+            </a:r>
+          </a:p>
+          <a:p>
+            <a:pPr marL="95250" indent="-95250">
+              <a:buFontTx/>
+              <a:buChar char="-"/>
+            </a:pPr>
+            <a:r>
+              <a:rPr lang="en-US" sz="900" dirty="0">
+                <a:solidFill>
+                  <a:schemeClr val="tx1"/>
+                </a:solidFill>
+              </a:rPr>
+              <a:t>is pointing to a 2</a:t>
+            </a:r>
+            <a:r>
+              <a:rPr lang="en-US" sz="900" baseline="30000" dirty="0">
+                <a:solidFill>
+                  <a:schemeClr val="tx1"/>
+                </a:solidFill>
+              </a:rPr>
+              <a:t>nd</a:t>
+            </a:r>
+            <a:r>
+              <a:rPr lang="en-US" sz="900" dirty="0">
+                <a:solidFill>
+                  <a:schemeClr val="tx1"/>
+                </a:solidFill>
+              </a:rPr>
+              <a:t> </a:t>
+            </a:r>
+            <a:r>
+              <a:rPr lang="en-US" sz="900" dirty="0">
+                <a:solidFill>
+                  <a:schemeClr val="tx1"/>
+                </a:solidFill>
+                <a:highlight>
+                  <a:srgbClr val="00FFFF"/>
+                </a:highlight>
+              </a:rPr>
+              <a:t>("sub") hash</a:t>
+            </a:r>
+            <a:r>
+              <a:rPr lang="en-US" sz="900" dirty="0">
+                <a:solidFill>
+                  <a:schemeClr val="tx1"/>
+                </a:solidFill>
+              </a:rPr>
+              <a:t> which</a:t>
+            </a:r>
+          </a:p>
+          <a:p>
+            <a:pPr marL="182563" lvl="1" indent="-87313">
+              <a:buFontTx/>
+              <a:buChar char="-"/>
+            </a:pPr>
+            <a:r>
+              <a:rPr lang="en-US" sz="900" dirty="0">
+                <a:solidFill>
+                  <a:schemeClr val="tx1"/>
+                </a:solidFill>
+              </a:rPr>
+              <a:t>contains 'sales' that is used to sort in descending order</a:t>
+            </a:r>
+          </a:p>
+          <a:p>
+            <a:pPr marL="182563" lvl="1" indent="-87313">
+              <a:buFontTx/>
+              <a:buChar char="-"/>
+            </a:pPr>
+            <a:r>
+              <a:rPr lang="en-US" sz="900" dirty="0">
+                <a:solidFill>
+                  <a:schemeClr val="tx1"/>
+                </a:solidFill>
+              </a:rPr>
+              <a:t>contains the rest of the variables ('</a:t>
+            </a:r>
+            <a:r>
+              <a:rPr lang="en-US" sz="900" dirty="0" err="1">
+                <a:solidFill>
+                  <a:schemeClr val="tx1"/>
+                </a:solidFill>
+              </a:rPr>
+              <a:t>product_ID</a:t>
+            </a:r>
+            <a:r>
+              <a:rPr lang="en-US" sz="900" dirty="0">
+                <a:solidFill>
+                  <a:schemeClr val="tx1"/>
+                </a:solidFill>
+              </a:rPr>
+              <a:t>')</a:t>
+            </a:r>
+          </a:p>
+          <a:p>
+            <a:pPr marL="182563" lvl="1" indent="-87313">
+              <a:buFontTx/>
+              <a:buChar char="-"/>
+            </a:pPr>
+            <a:r>
+              <a:rPr lang="en-US" sz="900" dirty="0">
+                <a:solidFill>
+                  <a:schemeClr val="tx1"/>
+                </a:solidFill>
+              </a:rPr>
+              <a:t>could point to further "sub" hashes if necessary</a:t>
+            </a:r>
+          </a:p>
+        </p:txBody>
+      </p:sp>
+      <p:sp>
+        <p:nvSpPr>
+          <p:cNvPr id="70" name="Rounded Rectangular Callout 69">
+            <a:extLst>
+              <a:ext uri="{FF2B5EF4-FFF2-40B4-BE49-F238E27FC236}">
+                <a16:creationId xmlns:a16="http://schemas.microsoft.com/office/drawing/2014/main" id="{48DD44AA-CC29-504B-A824-A09B5DCAB634}"/>
+              </a:ext>
+            </a:extLst>
+          </p:cNvPr>
+          <p:cNvSpPr/>
+          <p:nvPr/>
+        </p:nvSpPr>
+        <p:spPr>
+          <a:xfrm>
+            <a:off x="6515970" y="850079"/>
+            <a:ext cx="4620607" cy="756000"/>
+          </a:xfrm>
+          <a:prstGeom prst="wedgeRoundRectCallout">
+            <a:avLst>
+              <a:gd name="adj1" fmla="val -11821"/>
+              <a:gd name="adj2" fmla="val 63817"/>
+              <a:gd name="adj3" fmla="val 16667"/>
+            </a:avLst>
+          </a:prstGeom>
+          <a:solidFill>
+            <a:schemeClr val="accent6">
+              <a:lumMod val="20000"/>
+              <a:lumOff val="80000"/>
+            </a:schemeClr>
+          </a:solidFill>
+          <a:ln>
+            <a:noFill/>
+          </a:ln>
+          <a:effectLst>
+            <a:outerShdw blurRad="50800" dist="38100" dir="2700000" algn="tl" rotWithShape="0">
+              <a:prstClr val="black">
+                <a:alpha val="40000"/>
+              </a:prstClr>
+            </a:outerShdw>
+          </a:effectLst>
+        </p:spPr>
+        <p:style>
+          <a:lnRef idx="2">
+            <a:schemeClr val="accent1">
+              <a:shade val="50000"/>
+            </a:schemeClr>
+          </a:lnRef>
+          <a:fillRef idx="1">
+            <a:schemeClr val="accent1"/>
+          </a:fillRef>
+          <a:effectRef idx="0">
+            <a:schemeClr val="accent1"/>
+          </a:effectRef>
+          <a:fontRef idx="minor">
+            <a:schemeClr val="lt1"/>
+          </a:fontRef>
+        </p:style>
+        <p:txBody>
+          <a:bodyPr rot="0" spcFirstLastPara="0" vertOverflow="overflow" horzOverflow="overflow" vert="horz" wrap="square" lIns="91440" tIns="45720" rIns="91440" bIns="45720" numCol="1" spcCol="0" rtlCol="0" fromWordArt="0" anchor="t" anchorCtr="0" forceAA="0" compatLnSpc="1">
+            <a:prstTxWarp prst="textNoShape">
+              <a:avLst/>
+            </a:prstTxWarp>
+            <a:noAutofit/>
+          </a:bodyPr>
+          <a:lstStyle/>
+          <a:p>
+            <a:r>
+              <a:rPr lang="en-US" sz="1000" b="1" dirty="0">
+                <a:solidFill>
+                  <a:schemeClr val="tx1"/>
+                </a:solidFill>
+              </a:rPr>
+              <a:t>Example Result:</a:t>
+            </a:r>
+          </a:p>
+          <a:p>
+            <a:pPr marL="93663" indent="-93663">
+              <a:buFontTx/>
+              <a:buChar char="-"/>
+            </a:pPr>
+            <a:r>
+              <a:rPr lang="en-US" sz="1000" dirty="0">
+                <a:solidFill>
+                  <a:schemeClr val="tx1"/>
+                </a:solidFill>
+              </a:rPr>
+              <a:t>Output data set in required sorting order</a:t>
+            </a:r>
+          </a:p>
+          <a:p>
+            <a:pPr marL="93663" indent="-93663">
+              <a:buFontTx/>
+              <a:buChar char="-"/>
+            </a:pPr>
+            <a:r>
+              <a:rPr lang="en-US" sz="1000" dirty="0">
+                <a:solidFill>
+                  <a:schemeClr val="tx1"/>
+                </a:solidFill>
+              </a:rPr>
+              <a:t>Output data in several subsets (for each value of 'store') in required sorting order</a:t>
+            </a:r>
+          </a:p>
+          <a:p>
+            <a:pPr marL="93663" indent="-93663">
+              <a:buFontTx/>
+              <a:buChar char="-"/>
+            </a:pPr>
+            <a:r>
+              <a:rPr lang="en-US" sz="1000" dirty="0">
+                <a:solidFill>
+                  <a:schemeClr val="tx1"/>
+                </a:solidFill>
+              </a:rPr>
+              <a:t>Extra data set containing stats.</a:t>
+            </a:r>
+          </a:p>
+        </p:txBody>
+      </p:sp>
     </p:spTree>
     <p:extLst>
       <p:ext uri="{BB962C8B-B14F-4D97-AF65-F5344CB8AC3E}">

</xml_diff>